<commit_message>
insert country code in obsesity table
</commit_message>
<xml_diff>
--- a/ETL Project Write-up.pptx
+++ b/ETL Project Write-up.pptx
@@ -12,9 +12,10 @@
     <p:sldId id="270" r:id="rId6"/>
     <p:sldId id="266" r:id="rId7"/>
     <p:sldId id="263" r:id="rId8"/>
-    <p:sldId id="259" r:id="rId9"/>
-    <p:sldId id="260" r:id="rId10"/>
-    <p:sldId id="261" r:id="rId11"/>
+    <p:sldId id="271" r:id="rId9"/>
+    <p:sldId id="259" r:id="rId10"/>
+    <p:sldId id="260" r:id="rId11"/>
+    <p:sldId id="261" r:id="rId12"/>
   </p:sldIdLst>
   <p:sldSz cx="12192000" cy="6858000"/>
   <p:notesSz cx="6858000" cy="9144000"/>
@@ -6094,7 +6095,7 @@
           <a:p>
             <a:fld id="{32637B58-87C1-446D-BDA9-B06F4BCF7782}" type="datetimeFigureOut">
               <a:rPr lang="en-US" smtClean="0"/>
-              <a:t>12/14/2020</a:t>
+              <a:t>12/15/2020</a:t>
             </a:fld>
             <a:endParaRPr lang="en-US"/>
           </a:p>
@@ -6297,7 +6298,7 @@
           <a:p>
             <a:fld id="{32637B58-87C1-446D-BDA9-B06F4BCF7782}" type="datetimeFigureOut">
               <a:rPr lang="en-US" smtClean="0"/>
-              <a:t>12/14/2020</a:t>
+              <a:t>12/15/2020</a:t>
             </a:fld>
             <a:endParaRPr lang="en-US"/>
           </a:p>
@@ -6505,7 +6506,7 @@
           <a:p>
             <a:fld id="{32637B58-87C1-446D-BDA9-B06F4BCF7782}" type="datetimeFigureOut">
               <a:rPr lang="en-US" smtClean="0"/>
-              <a:t>12/14/2020</a:t>
+              <a:t>12/15/2020</a:t>
             </a:fld>
             <a:endParaRPr lang="en-US"/>
           </a:p>
@@ -6754,7 +6755,7 @@
           <a:p>
             <a:fld id="{32637B58-87C1-446D-BDA9-B06F4BCF7782}" type="datetimeFigureOut">
               <a:rPr lang="en-US" smtClean="0"/>
-              <a:t>12/14/2020</a:t>
+              <a:t>12/15/2020</a:t>
             </a:fld>
             <a:endParaRPr lang="en-US"/>
           </a:p>
@@ -7058,7 +7059,7 @@
           <a:p>
             <a:fld id="{32637B58-87C1-446D-BDA9-B06F4BCF7782}" type="datetimeFigureOut">
               <a:rPr lang="en-US" smtClean="0"/>
-              <a:t>12/14/2020</a:t>
+              <a:t>12/15/2020</a:t>
             </a:fld>
             <a:endParaRPr lang="en-US"/>
           </a:p>
@@ -7325,7 +7326,7 @@
           <a:p>
             <a:fld id="{32637B58-87C1-446D-BDA9-B06F4BCF7782}" type="datetimeFigureOut">
               <a:rPr lang="en-US" smtClean="0"/>
-              <a:t>12/14/2020</a:t>
+              <a:t>12/15/2020</a:t>
             </a:fld>
             <a:endParaRPr lang="en-US"/>
           </a:p>
@@ -7780,7 +7781,7 @@
           <a:p>
             <a:fld id="{32637B58-87C1-446D-BDA9-B06F4BCF7782}" type="datetimeFigureOut">
               <a:rPr lang="en-US" smtClean="0"/>
-              <a:t>12/14/2020</a:t>
+              <a:t>12/15/2020</a:t>
             </a:fld>
             <a:endParaRPr lang="en-US"/>
           </a:p>
@@ -7921,7 +7922,7 @@
           <a:p>
             <a:fld id="{32637B58-87C1-446D-BDA9-B06F4BCF7782}" type="datetimeFigureOut">
               <a:rPr lang="en-US" smtClean="0"/>
-              <a:t>12/14/2020</a:t>
+              <a:t>12/15/2020</a:t>
             </a:fld>
             <a:endParaRPr lang="en-US"/>
           </a:p>
@@ -8034,7 +8035,7 @@
           <a:p>
             <a:fld id="{32637B58-87C1-446D-BDA9-B06F4BCF7782}" type="datetimeFigureOut">
               <a:rPr lang="en-US" smtClean="0"/>
-              <a:t>12/14/2020</a:t>
+              <a:t>12/15/2020</a:t>
             </a:fld>
             <a:endParaRPr lang="en-US"/>
           </a:p>
@@ -8345,7 +8346,7 @@
           <a:p>
             <a:fld id="{32637B58-87C1-446D-BDA9-B06F4BCF7782}" type="datetimeFigureOut">
               <a:rPr lang="en-US" smtClean="0"/>
-              <a:t>12/14/2020</a:t>
+              <a:t>12/15/2020</a:t>
             </a:fld>
             <a:endParaRPr lang="en-US"/>
           </a:p>
@@ -8636,7 +8637,7 @@
           <a:p>
             <a:fld id="{32637B58-87C1-446D-BDA9-B06F4BCF7782}" type="datetimeFigureOut">
               <a:rPr lang="en-US" smtClean="0"/>
-              <a:t>12/14/2020</a:t>
+              <a:t>12/15/2020</a:t>
             </a:fld>
             <a:endParaRPr lang="en-US"/>
           </a:p>
@@ -9045,7 +9046,7 @@
             <a:fld id="{32637B58-87C1-446D-BDA9-B06F4BCF7782}" type="datetimeFigureOut">
               <a:rPr lang="en-US" smtClean="0"/>
               <a:pPr/>
-              <a:t>12/14/2020</a:t>
+              <a:t>12/15/2020</a:t>
             </a:fld>
             <a:endParaRPr lang="en-US" dirty="0"/>
           </a:p>
@@ -10071,6 +10072,90 @@
           <a:p>
             <a:r>
               <a:rPr lang="en-US" dirty="0"/>
+              <a:t>Load</a:t>
+            </a:r>
+            <a:endParaRPr lang="en-CA" dirty="0"/>
+          </a:p>
+        </p:txBody>
+      </p:sp>
+      <p:sp>
+        <p:nvSpPr>
+          <p:cNvPr id="3" name="Content Placeholder 2">
+            <a:extLst>
+              <a:ext uri="{FF2B5EF4-FFF2-40B4-BE49-F238E27FC236}">
+                <a16:creationId xmlns:a16="http://schemas.microsoft.com/office/drawing/2014/main" id="{70B56692-824B-4FA6-BD9C-2B9D47129C08}"/>
+              </a:ext>
+            </a:extLst>
+          </p:cNvPr>
+          <p:cNvSpPr>
+            <a:spLocks noGrp="1"/>
+          </p:cNvSpPr>
+          <p:nvPr>
+            <p:ph idx="1"/>
+          </p:nvPr>
+        </p:nvSpPr>
+        <p:spPr/>
+        <p:txBody>
+          <a:bodyPr/>
+          <a:lstStyle/>
+          <a:p>
+            <a:endParaRPr lang="en-CA" dirty="0"/>
+          </a:p>
+        </p:txBody>
+      </p:sp>
+    </p:spTree>
+    <p:extLst>
+      <p:ext uri="{BB962C8B-B14F-4D97-AF65-F5344CB8AC3E}">
+        <p14:creationId xmlns:p14="http://schemas.microsoft.com/office/powerpoint/2010/main" val="509606186"/>
+      </p:ext>
+    </p:extLst>
+  </p:cSld>
+  <p:clrMapOvr>
+    <a:masterClrMapping/>
+  </p:clrMapOvr>
+</p:sld>
+</file>
+
+<file path=ppt/slides/slide11.xml><?xml version="1.0" encoding="utf-8"?>
+<p:sld xmlns:a="http://schemas.openxmlformats.org/drawingml/2006/main" xmlns:r="http://schemas.openxmlformats.org/officeDocument/2006/relationships" xmlns:p="http://schemas.openxmlformats.org/presentationml/2006/main">
+  <p:cSld>
+    <p:spTree>
+      <p:nvGrpSpPr>
+        <p:cNvPr id="1" name=""/>
+        <p:cNvGrpSpPr/>
+        <p:nvPr/>
+      </p:nvGrpSpPr>
+      <p:grpSpPr>
+        <a:xfrm>
+          <a:off x="0" y="0"/>
+          <a:ext cx="0" cy="0"/>
+          <a:chOff x="0" y="0"/>
+          <a:chExt cx="0" cy="0"/>
+        </a:xfrm>
+      </p:grpSpPr>
+      <p:sp>
+        <p:nvSpPr>
+          <p:cNvPr id="2" name="Title 1">
+            <a:extLst>
+              <a:ext uri="{FF2B5EF4-FFF2-40B4-BE49-F238E27FC236}">
+                <a16:creationId xmlns:a16="http://schemas.microsoft.com/office/drawing/2014/main" id="{3EE24A2F-9997-431F-B27F-BAF9F5A4CD26}"/>
+              </a:ext>
+            </a:extLst>
+          </p:cNvPr>
+          <p:cNvSpPr>
+            <a:spLocks noGrp="1"/>
+          </p:cNvSpPr>
+          <p:nvPr>
+            <p:ph type="title"/>
+          </p:nvPr>
+        </p:nvSpPr>
+        <p:spPr/>
+        <p:txBody>
+          <a:bodyPr/>
+          <a:lstStyle/>
+          <a:p>
+            <a:r>
+              <a:rPr lang="en-US" dirty="0"/>
               <a:t>Summary</a:t>
             </a:r>
             <a:endParaRPr lang="en-CA" dirty="0"/>
@@ -14024,6 +14109,14 @@
 <file path=ppt/slides/slide8.xml><?xml version="1.0" encoding="utf-8"?>
 <p:sld xmlns:a="http://schemas.openxmlformats.org/drawingml/2006/main" xmlns:r="http://schemas.openxmlformats.org/officeDocument/2006/relationships" xmlns:p="http://schemas.openxmlformats.org/presentationml/2006/main">
   <p:cSld>
+    <p:bg>
+      <p:bgPr>
+        <a:solidFill>
+          <a:schemeClr val="bg2"/>
+        </a:solidFill>
+        <a:effectLst/>
+      </p:bgPr>
+    </p:bg>
     <p:spTree>
       <p:nvGrpSpPr>
         <p:cNvPr id="1" name=""/>
@@ -14038,6 +14131,308 @@
           <a:chExt cx="0" cy="0"/>
         </a:xfrm>
       </p:grpSpPr>
+      <p:sp useBgFill="1">
+        <p:nvSpPr>
+          <p:cNvPr id="111" name="Rectangle 102">
+            <a:extLst>
+              <a:ext uri="{FF2B5EF4-FFF2-40B4-BE49-F238E27FC236}">
+                <a16:creationId xmlns:a16="http://schemas.microsoft.com/office/drawing/2014/main" id="{369DB5D3-4B63-4FD1-BA37-8EBACA587A1D}"/>
+              </a:ext>
+              <a:ext uri="{C183D7F6-B498-43B3-948B-1728B52AA6E4}">
+                <adec:decorative xmlns:adec="http://schemas.microsoft.com/office/drawing/2017/decorative" val="1"/>
+              </a:ext>
+            </a:extLst>
+          </p:cNvPr>
+          <p:cNvSpPr>
+            <a:spLocks noGrp="1" noRot="1" noChangeAspect="1" noMove="1" noResize="1" noEditPoints="1" noAdjustHandles="1" noChangeArrowheads="1" noChangeShapeType="1" noTextEdit="1"/>
+          </p:cNvSpPr>
+          <p:nvPr>
+            <p:extLst>
+              <p:ext uri="{386F3935-93C4-4BCD-93E2-E3B085C9AB24}">
+                <p16:designElem xmlns:p16="http://schemas.microsoft.com/office/powerpoint/2015/main" val="1"/>
+              </p:ext>
+            </p:extLst>
+          </p:nvPr>
+        </p:nvSpPr>
+        <p:spPr>
+          <a:xfrm>
+            <a:off x="0" y="0"/>
+            <a:ext cx="12192000" cy="6858000"/>
+          </a:xfrm>
+          <a:prstGeom prst="rect">
+            <a:avLst/>
+          </a:prstGeom>
+          <a:ln w="12700" cap="flat" cmpd="sng" algn="ctr">
+            <a:noFill/>
+            <a:prstDash val="solid"/>
+            <a:miter lim="800000"/>
+          </a:ln>
+          <a:effectLst/>
+          <a:extLst>
+            <a:ext uri="{91240B29-F687-4F45-9708-019B960494DF}">
+              <a14:hiddenLine xmlns:a14="http://schemas.microsoft.com/office/drawing/2010/main" w="12700" cap="flat" cmpd="sng" algn="ctr">
+                <a:solidFill>
+                  <a:schemeClr val="accent1">
+                    <a:shade val="50000"/>
+                  </a:schemeClr>
+                </a:solidFill>
+                <a:prstDash val="solid"/>
+                <a:miter lim="800000"/>
+              </a14:hiddenLine>
+            </a:ext>
+          </a:extLst>
+        </p:spPr>
+        <p:style>
+          <a:lnRef idx="2">
+            <a:schemeClr val="accent1">
+              <a:shade val="50000"/>
+            </a:schemeClr>
+          </a:lnRef>
+          <a:fillRef idx="1">
+            <a:schemeClr val="accent1"/>
+          </a:fillRef>
+          <a:effectRef idx="0">
+            <a:schemeClr val="accent1"/>
+          </a:effectRef>
+          <a:fontRef idx="minor">
+            <a:schemeClr val="lt1"/>
+          </a:fontRef>
+        </p:style>
+        <p:txBody>
+          <a:bodyPr rtlCol="0" anchor="ctr"/>
+          <a:lstStyle/>
+          <a:p>
+            <a:pPr algn="ctr"/>
+            <a:endParaRPr lang="en-US"/>
+          </a:p>
+        </p:txBody>
+      </p:sp>
+      <p:sp>
+        <p:nvSpPr>
+          <p:cNvPr id="112" name="Rectangle 104">
+            <a:extLst>
+              <a:ext uri="{FF2B5EF4-FFF2-40B4-BE49-F238E27FC236}">
+                <a16:creationId xmlns:a16="http://schemas.microsoft.com/office/drawing/2014/main" id="{5BBDA1FD-F245-4707-9DD0-B21388E6D53F}"/>
+              </a:ext>
+              <a:ext uri="{C183D7F6-B498-43B3-948B-1728B52AA6E4}">
+                <adec:decorative xmlns:adec="http://schemas.microsoft.com/office/drawing/2017/decorative" val="1"/>
+              </a:ext>
+            </a:extLst>
+          </p:cNvPr>
+          <p:cNvSpPr>
+            <a:spLocks noGrp="1" noRot="1" noChangeAspect="1" noMove="1" noResize="1" noEditPoints="1" noAdjustHandles="1" noChangeArrowheads="1" noChangeShapeType="1" noTextEdit="1"/>
+          </p:cNvSpPr>
+          <p:nvPr>
+            <p:extLst>
+              <p:ext uri="{386F3935-93C4-4BCD-93E2-E3B085C9AB24}">
+                <p16:designElem xmlns:p16="http://schemas.microsoft.com/office/powerpoint/2015/main" val="1"/>
+              </p:ext>
+            </p:extLst>
+          </p:nvPr>
+        </p:nvSpPr>
+        <p:spPr>
+          <a:xfrm>
+            <a:off x="-10288" y="0"/>
+            <a:ext cx="7875323" cy="6853236"/>
+          </a:xfrm>
+          <a:prstGeom prst="rect">
+            <a:avLst/>
+          </a:prstGeom>
+          <a:solidFill>
+            <a:schemeClr val="accent2"/>
+          </a:solidFill>
+          <a:ln>
+            <a:noFill/>
+          </a:ln>
+        </p:spPr>
+        <p:style>
+          <a:lnRef idx="2">
+            <a:schemeClr val="accent1">
+              <a:shade val="50000"/>
+            </a:schemeClr>
+          </a:lnRef>
+          <a:fillRef idx="1">
+            <a:schemeClr val="accent1"/>
+          </a:fillRef>
+          <a:effectRef idx="0">
+            <a:schemeClr val="accent1"/>
+          </a:effectRef>
+          <a:fontRef idx="minor">
+            <a:schemeClr val="lt1"/>
+          </a:fontRef>
+        </p:style>
+        <p:txBody>
+          <a:bodyPr rtlCol="0" anchor="ctr"/>
+          <a:lstStyle/>
+          <a:p>
+            <a:pPr algn="ctr"/>
+            <a:endParaRPr lang="en-US"/>
+          </a:p>
+        </p:txBody>
+      </p:sp>
+      <p:sp>
+        <p:nvSpPr>
+          <p:cNvPr id="113" name="Freeform: Shape 106">
+            <a:extLst>
+              <a:ext uri="{FF2B5EF4-FFF2-40B4-BE49-F238E27FC236}">
+                <a16:creationId xmlns:a16="http://schemas.microsoft.com/office/drawing/2014/main" id="{4D65F7CF-078D-4DB9-942F-CA5C78C7357A}"/>
+              </a:ext>
+              <a:ext uri="{C183D7F6-B498-43B3-948B-1728B52AA6E4}">
+                <adec:decorative xmlns:adec="http://schemas.microsoft.com/office/drawing/2017/decorative" val="1"/>
+              </a:ext>
+            </a:extLst>
+          </p:cNvPr>
+          <p:cNvSpPr>
+            <a:spLocks noGrp="1" noRot="1" noChangeAspect="1" noMove="1" noResize="1" noEditPoints="1" noAdjustHandles="1" noChangeArrowheads="1" noChangeShapeType="1" noTextEdit="1"/>
+          </p:cNvSpPr>
+          <p:nvPr>
+            <p:extLst>
+              <p:ext uri="{386F3935-93C4-4BCD-93E2-E3B085C9AB24}">
+                <p16:designElem xmlns:p16="http://schemas.microsoft.com/office/powerpoint/2015/main" val="1"/>
+              </p:ext>
+            </p:extLst>
+          </p:nvPr>
+        </p:nvSpPr>
+        <p:spPr>
+          <a:xfrm rot="10800000">
+            <a:off x="468624" y="0"/>
+            <a:ext cx="7351628" cy="6858000"/>
+          </a:xfrm>
+          <a:custGeom>
+            <a:avLst/>
+            <a:gdLst>
+              <a:gd name="connsiteX0" fmla="*/ 0 w 7351628"/>
+              <a:gd name="connsiteY0" fmla="*/ 0 h 6858000"/>
+              <a:gd name="connsiteX1" fmla="*/ 1482273 w 7351628"/>
+              <a:gd name="connsiteY1" fmla="*/ 0 h 6858000"/>
+              <a:gd name="connsiteX2" fmla="*/ 2438400 w 7351628"/>
+              <a:gd name="connsiteY2" fmla="*/ 0 h 6858000"/>
+              <a:gd name="connsiteX3" fmla="*/ 7351628 w 7351628"/>
+              <a:gd name="connsiteY3" fmla="*/ 0 h 6858000"/>
+              <a:gd name="connsiteX4" fmla="*/ 3920673 w 7351628"/>
+              <a:gd name="connsiteY4" fmla="*/ 3430955 h 6858000"/>
+              <a:gd name="connsiteX5" fmla="*/ 7175072 w 7351628"/>
+              <a:gd name="connsiteY5" fmla="*/ 6857446 h 6858000"/>
+              <a:gd name="connsiteX6" fmla="*/ 7196984 w 7351628"/>
+              <a:gd name="connsiteY6" fmla="*/ 6858000 h 6858000"/>
+              <a:gd name="connsiteX7" fmla="*/ 2438400 w 7351628"/>
+              <a:gd name="connsiteY7" fmla="*/ 6858000 h 6858000"/>
+              <a:gd name="connsiteX8" fmla="*/ 1482273 w 7351628"/>
+              <a:gd name="connsiteY8" fmla="*/ 6858000 h 6858000"/>
+              <a:gd name="connsiteX9" fmla="*/ 0 w 7351628"/>
+              <a:gd name="connsiteY9" fmla="*/ 6858000 h 6858000"/>
+            </a:gdLst>
+            <a:ahLst/>
+            <a:cxnLst>
+              <a:cxn ang="0">
+                <a:pos x="connsiteX0" y="connsiteY0"/>
+              </a:cxn>
+              <a:cxn ang="0">
+                <a:pos x="connsiteX1" y="connsiteY1"/>
+              </a:cxn>
+              <a:cxn ang="0">
+                <a:pos x="connsiteX2" y="connsiteY2"/>
+              </a:cxn>
+              <a:cxn ang="0">
+                <a:pos x="connsiteX3" y="connsiteY3"/>
+              </a:cxn>
+              <a:cxn ang="0">
+                <a:pos x="connsiteX4" y="connsiteY4"/>
+              </a:cxn>
+              <a:cxn ang="0">
+                <a:pos x="connsiteX5" y="connsiteY5"/>
+              </a:cxn>
+              <a:cxn ang="0">
+                <a:pos x="connsiteX6" y="connsiteY6"/>
+              </a:cxn>
+              <a:cxn ang="0">
+                <a:pos x="connsiteX7" y="connsiteY7"/>
+              </a:cxn>
+              <a:cxn ang="0">
+                <a:pos x="connsiteX8" y="connsiteY8"/>
+              </a:cxn>
+              <a:cxn ang="0">
+                <a:pos x="connsiteX9" y="connsiteY9"/>
+              </a:cxn>
+            </a:cxnLst>
+            <a:rect l="l" t="t" r="r" b="b"/>
+            <a:pathLst>
+              <a:path w="7351628" h="6858000">
+                <a:moveTo>
+                  <a:pt x="0" y="0"/>
+                </a:moveTo>
+                <a:lnTo>
+                  <a:pt x="1482273" y="0"/>
+                </a:lnTo>
+                <a:lnTo>
+                  <a:pt x="2438400" y="0"/>
+                </a:lnTo>
+                <a:lnTo>
+                  <a:pt x="7351628" y="0"/>
+                </a:lnTo>
+                <a:cubicBezTo>
+                  <a:pt x="5456764" y="0"/>
+                  <a:pt x="3920673" y="1536091"/>
+                  <a:pt x="3920673" y="3430955"/>
+                </a:cubicBezTo>
+                <a:cubicBezTo>
+                  <a:pt x="3920673" y="5266604"/>
+                  <a:pt x="5362258" y="6765554"/>
+                  <a:pt x="7175072" y="6857446"/>
+                </a:cubicBezTo>
+                <a:lnTo>
+                  <a:pt x="7196984" y="6858000"/>
+                </a:lnTo>
+                <a:lnTo>
+                  <a:pt x="2438400" y="6858000"/>
+                </a:lnTo>
+                <a:lnTo>
+                  <a:pt x="1482273" y="6858000"/>
+                </a:lnTo>
+                <a:lnTo>
+                  <a:pt x="0" y="6858000"/>
+                </a:lnTo>
+                <a:close/>
+              </a:path>
+            </a:pathLst>
+          </a:custGeom>
+          <a:solidFill>
+            <a:schemeClr val="accent2">
+              <a:lumMod val="75000"/>
+              <a:alpha val="70000"/>
+            </a:schemeClr>
+          </a:solidFill>
+          <a:ln>
+            <a:noFill/>
+          </a:ln>
+        </p:spPr>
+        <p:style>
+          <a:lnRef idx="2">
+            <a:schemeClr val="accent1">
+              <a:shade val="50000"/>
+            </a:schemeClr>
+          </a:lnRef>
+          <a:fillRef idx="1">
+            <a:schemeClr val="accent1"/>
+          </a:fillRef>
+          <a:effectRef idx="0">
+            <a:schemeClr val="accent1"/>
+          </a:effectRef>
+          <a:fontRef idx="minor">
+            <a:schemeClr val="lt1"/>
+          </a:fontRef>
+        </p:style>
+        <p:txBody>
+          <a:bodyPr wrap="square" rtlCol="0" anchor="ctr">
+            <a:noAutofit/>
+          </a:bodyPr>
+          <a:lstStyle/>
+          <a:p>
+            <a:pPr algn="ctr"/>
+            <a:endParaRPr lang="en-US"/>
+          </a:p>
+        </p:txBody>
+      </p:sp>
       <p:sp>
         <p:nvSpPr>
           <p:cNvPr id="2" name="Title 1">
@@ -14054,22 +14449,206 @@
             <p:ph type="title"/>
           </p:nvPr>
         </p:nvSpPr>
-        <p:spPr/>
+        <p:spPr>
+          <a:xfrm>
+            <a:off x="609600" y="685800"/>
+            <a:ext cx="2952465" cy="5486400"/>
+          </a:xfrm>
+        </p:spPr>
         <p:txBody>
-          <a:bodyPr/>
+          <a:bodyPr anchor="ctr">
+            <a:normAutofit/>
+          </a:bodyPr>
           <a:lstStyle/>
           <a:p>
             <a:r>
-              <a:rPr lang="en-US" dirty="0"/>
-              <a:t>Transform</a:t>
+              <a:rPr lang="en-US" sz="2500">
+                <a:solidFill>
+                  <a:srgbClr val="FFFFFF"/>
+                </a:solidFill>
+              </a:rPr>
+              <a:t>Transformation</a:t>
             </a:r>
-            <a:endParaRPr lang="en-CA" dirty="0"/>
+            <a:endParaRPr lang="en-CA" sz="2500">
+              <a:solidFill>
+                <a:srgbClr val="FFFFFF"/>
+              </a:solidFill>
+            </a:endParaRPr>
+          </a:p>
+        </p:txBody>
+      </p:sp>
+      <p:sp useBgFill="1">
+        <p:nvSpPr>
+          <p:cNvPr id="114" name="Freeform: Shape 108">
+            <a:extLst>
+              <a:ext uri="{FF2B5EF4-FFF2-40B4-BE49-F238E27FC236}">
+                <a16:creationId xmlns:a16="http://schemas.microsoft.com/office/drawing/2014/main" id="{7C754B97-BF4D-4E8F-8EC3-4906E36CEA22}"/>
+              </a:ext>
+              <a:ext uri="{C183D7F6-B498-43B3-948B-1728B52AA6E4}">
+                <adec:decorative xmlns:adec="http://schemas.microsoft.com/office/drawing/2017/decorative" val="1"/>
+              </a:ext>
+            </a:extLst>
+          </p:cNvPr>
+          <p:cNvSpPr>
+            <a:spLocks noGrp="1" noRot="1" noChangeAspect="1" noMove="1" noResize="1" noEditPoints="1" noAdjustHandles="1" noChangeArrowheads="1" noChangeShapeType="1" noTextEdit="1"/>
+          </p:cNvSpPr>
+          <p:nvPr>
+            <p:extLst>
+              <p:ext uri="{386F3935-93C4-4BCD-93E2-E3B085C9AB24}">
+                <p16:designElem xmlns:p16="http://schemas.microsoft.com/office/powerpoint/2015/main" val="1"/>
+              </p:ext>
+            </p:extLst>
+          </p:nvPr>
+        </p:nvSpPr>
+        <p:spPr>
+          <a:xfrm rot="10800000">
+            <a:off x="3904573" y="0"/>
+            <a:ext cx="5963231" cy="6861910"/>
+          </a:xfrm>
+          <a:custGeom>
+            <a:avLst/>
+            <a:gdLst>
+              <a:gd name="connsiteX0" fmla="*/ 2532276 w 5963231"/>
+              <a:gd name="connsiteY0" fmla="*/ 6861910 h 6861910"/>
+              <a:gd name="connsiteX1" fmla="*/ 2377645 w 5963231"/>
+              <a:gd name="connsiteY1" fmla="*/ 6858000 h 6861910"/>
+              <a:gd name="connsiteX2" fmla="*/ 0 w 5963231"/>
+              <a:gd name="connsiteY2" fmla="*/ 6858000 h 6861910"/>
+              <a:gd name="connsiteX3" fmla="*/ 0 w 5963231"/>
+              <a:gd name="connsiteY3" fmla="*/ 0 h 6861910"/>
+              <a:gd name="connsiteX4" fmla="*/ 2532276 w 5963231"/>
+              <a:gd name="connsiteY4" fmla="*/ 0 h 6861910"/>
+              <a:gd name="connsiteX5" fmla="*/ 2547568 w 5963231"/>
+              <a:gd name="connsiteY5" fmla="*/ 0 h 6861910"/>
+              <a:gd name="connsiteX6" fmla="*/ 2547568 w 5963231"/>
+              <a:gd name="connsiteY6" fmla="*/ 387 h 6861910"/>
+              <a:gd name="connsiteX7" fmla="*/ 2708832 w 5963231"/>
+              <a:gd name="connsiteY7" fmla="*/ 4464 h 6861910"/>
+              <a:gd name="connsiteX8" fmla="*/ 5963231 w 5963231"/>
+              <a:gd name="connsiteY8" fmla="*/ 3430955 h 6861910"/>
+              <a:gd name="connsiteX9" fmla="*/ 2532276 w 5963231"/>
+              <a:gd name="connsiteY9" fmla="*/ 6861910 h 6861910"/>
+              <a:gd name="connsiteX0" fmla="*/ 2532276 w 5963231"/>
+              <a:gd name="connsiteY0" fmla="*/ 6861910 h 6861910"/>
+              <a:gd name="connsiteX1" fmla="*/ 0 w 5963231"/>
+              <a:gd name="connsiteY1" fmla="*/ 6858000 h 6861910"/>
+              <a:gd name="connsiteX2" fmla="*/ 0 w 5963231"/>
+              <a:gd name="connsiteY2" fmla="*/ 0 h 6861910"/>
+              <a:gd name="connsiteX3" fmla="*/ 2532276 w 5963231"/>
+              <a:gd name="connsiteY3" fmla="*/ 0 h 6861910"/>
+              <a:gd name="connsiteX4" fmla="*/ 2547568 w 5963231"/>
+              <a:gd name="connsiteY4" fmla="*/ 0 h 6861910"/>
+              <a:gd name="connsiteX5" fmla="*/ 2547568 w 5963231"/>
+              <a:gd name="connsiteY5" fmla="*/ 387 h 6861910"/>
+              <a:gd name="connsiteX6" fmla="*/ 2708832 w 5963231"/>
+              <a:gd name="connsiteY6" fmla="*/ 4464 h 6861910"/>
+              <a:gd name="connsiteX7" fmla="*/ 5963231 w 5963231"/>
+              <a:gd name="connsiteY7" fmla="*/ 3430955 h 6861910"/>
+              <a:gd name="connsiteX8" fmla="*/ 2532276 w 5963231"/>
+              <a:gd name="connsiteY8" fmla="*/ 6861910 h 6861910"/>
+            </a:gdLst>
+            <a:ahLst/>
+            <a:cxnLst>
+              <a:cxn ang="0">
+                <a:pos x="connsiteX0" y="connsiteY0"/>
+              </a:cxn>
+              <a:cxn ang="0">
+                <a:pos x="connsiteX1" y="connsiteY1"/>
+              </a:cxn>
+              <a:cxn ang="0">
+                <a:pos x="connsiteX2" y="connsiteY2"/>
+              </a:cxn>
+              <a:cxn ang="0">
+                <a:pos x="connsiteX3" y="connsiteY3"/>
+              </a:cxn>
+              <a:cxn ang="0">
+                <a:pos x="connsiteX4" y="connsiteY4"/>
+              </a:cxn>
+              <a:cxn ang="0">
+                <a:pos x="connsiteX5" y="connsiteY5"/>
+              </a:cxn>
+              <a:cxn ang="0">
+                <a:pos x="connsiteX6" y="connsiteY6"/>
+              </a:cxn>
+              <a:cxn ang="0">
+                <a:pos x="connsiteX7" y="connsiteY7"/>
+              </a:cxn>
+              <a:cxn ang="0">
+                <a:pos x="connsiteX8" y="connsiteY8"/>
+              </a:cxn>
+            </a:cxnLst>
+            <a:rect l="l" t="t" r="r" b="b"/>
+            <a:pathLst>
+              <a:path w="5963231" h="6861910">
+                <a:moveTo>
+                  <a:pt x="2532276" y="6861910"/>
+                </a:moveTo>
+                <a:lnTo>
+                  <a:pt x="0" y="6858000"/>
+                </a:lnTo>
+                <a:lnTo>
+                  <a:pt x="0" y="0"/>
+                </a:lnTo>
+                <a:lnTo>
+                  <a:pt x="2532276" y="0"/>
+                </a:lnTo>
+                <a:lnTo>
+                  <a:pt x="2547568" y="0"/>
+                </a:lnTo>
+                <a:lnTo>
+                  <a:pt x="2547568" y="387"/>
+                </a:lnTo>
+                <a:lnTo>
+                  <a:pt x="2708832" y="4464"/>
+                </a:lnTo>
+                <a:cubicBezTo>
+                  <a:pt x="4521646" y="96356"/>
+                  <a:pt x="5963231" y="1595306"/>
+                  <a:pt x="5963231" y="3430955"/>
+                </a:cubicBezTo>
+                <a:cubicBezTo>
+                  <a:pt x="5963231" y="5325819"/>
+                  <a:pt x="4427140" y="6861910"/>
+                  <a:pt x="2532276" y="6861910"/>
+                </a:cubicBezTo>
+                <a:close/>
+              </a:path>
+            </a:pathLst>
+          </a:custGeom>
+          <a:ln w="3175">
+            <a:noFill/>
+          </a:ln>
+        </p:spPr>
+        <p:style>
+          <a:lnRef idx="2">
+            <a:schemeClr val="accent1">
+              <a:shade val="50000"/>
+            </a:schemeClr>
+          </a:lnRef>
+          <a:fillRef idx="1">
+            <a:schemeClr val="accent1"/>
+          </a:fillRef>
+          <a:effectRef idx="0">
+            <a:schemeClr val="accent1"/>
+          </a:effectRef>
+          <a:fontRef idx="minor">
+            <a:schemeClr val="lt1"/>
+          </a:fontRef>
+        </p:style>
+        <p:txBody>
+          <a:bodyPr wrap="square" rtlCol="0" anchor="ctr">
+            <a:noAutofit/>
+          </a:bodyPr>
+          <a:lstStyle/>
+          <a:p>
+            <a:pPr algn="ctr"/>
+            <a:endParaRPr lang="en-US"/>
           </a:p>
         </p:txBody>
       </p:sp>
       <p:sp>
         <p:nvSpPr>
-          <p:cNvPr id="3" name="Content Placeholder 2">
+          <p:cNvPr id="25" name="Content Placeholder 2">
             <a:extLst>
               <a:ext uri="{FF2B5EF4-FFF2-40B4-BE49-F238E27FC236}">
                 <a16:creationId xmlns:a16="http://schemas.microsoft.com/office/drawing/2014/main" id="{70B56692-824B-4FA6-BD9C-2B9D47129C08}"/>
@@ -14083,19 +14662,70 @@
             <p:ph idx="1"/>
           </p:nvPr>
         </p:nvSpPr>
-        <p:spPr/>
+        <p:spPr>
+          <a:xfrm>
+            <a:off x="4681538" y="685800"/>
+            <a:ext cx="3780074" cy="5491163"/>
+          </a:xfrm>
+        </p:spPr>
         <p:txBody>
-          <a:bodyPr/>
+          <a:bodyPr anchor="ctr">
+            <a:normAutofit/>
+          </a:bodyPr>
           <a:lstStyle/>
           <a:p>
-            <a:endParaRPr lang="en-CA" dirty="0"/>
+            <a:pPr marL="0" indent="0">
+              <a:buNone/>
+            </a:pPr>
+            <a:r>
+              <a:rPr lang="en-US" dirty="0"/>
+              <a:t>Transform is the process of converting the extracted data from its previous form into the form it needs to be in so that it can be placed into another database. Transformation occurs by using rules or lookup tables or by combining the data with other data.</a:t>
+            </a:r>
+          </a:p>
+          <a:p>
+            <a:pPr marL="0" indent="0">
+              <a:buNone/>
+            </a:pPr>
+            <a:r>
+              <a:rPr lang="en-US" dirty="0"/>
+              <a:t>The next few slides show the steps on how transform data.</a:t>
+            </a:r>
           </a:p>
         </p:txBody>
       </p:sp>
+      <p:pic>
+        <p:nvPicPr>
+          <p:cNvPr id="88" name="Picture 87">
+            <a:extLst>
+              <a:ext uri="{FF2B5EF4-FFF2-40B4-BE49-F238E27FC236}">
+                <a16:creationId xmlns:a16="http://schemas.microsoft.com/office/drawing/2014/main" id="{6F8D54E7-35B4-48F7-8162-32ACCA560BE0}"/>
+              </a:ext>
+            </a:extLst>
+          </p:cNvPr>
+          <p:cNvPicPr>
+            <a:picLocks noChangeAspect="1"/>
+          </p:cNvPicPr>
+          <p:nvPr/>
+        </p:nvPicPr>
+        <p:blipFill rotWithShape="1">
+          <a:blip r:embed="rId2"/>
+          <a:srcRect l="18527" r="49015"/>
+          <a:stretch/>
+        </p:blipFill>
+        <p:spPr>
+          <a:xfrm>
+            <a:off x="8975319" y="-13231"/>
+            <a:ext cx="3338900" cy="6866467"/>
+          </a:xfrm>
+          <a:prstGeom prst="rect">
+            <a:avLst/>
+          </a:prstGeom>
+        </p:spPr>
+      </p:pic>
     </p:spTree>
     <p:extLst>
       <p:ext uri="{BB962C8B-B14F-4D97-AF65-F5344CB8AC3E}">
-        <p14:creationId xmlns:p14="http://schemas.microsoft.com/office/powerpoint/2010/main" val="1542771243"/>
+        <p14:creationId xmlns:p14="http://schemas.microsoft.com/office/powerpoint/2010/main" val="3040566060"/>
       </p:ext>
     </p:extLst>
   </p:cSld>
@@ -14145,7 +14775,7 @@
           <a:p>
             <a:r>
               <a:rPr lang="en-US" dirty="0"/>
-              <a:t>Load</a:t>
+              <a:t>Transform - Me</a:t>
             </a:r>
             <a:endParaRPr lang="en-CA" dirty="0"/>
           </a:p>
@@ -14179,7 +14809,7 @@
     </p:spTree>
     <p:extLst>
       <p:ext uri="{BB962C8B-B14F-4D97-AF65-F5344CB8AC3E}">
-        <p14:creationId xmlns:p14="http://schemas.microsoft.com/office/powerpoint/2010/main" val="509606186"/>
+        <p14:creationId xmlns:p14="http://schemas.microsoft.com/office/powerpoint/2010/main" val="1542771243"/>
       </p:ext>
     </p:extLst>
   </p:cSld>

</xml_diff>